<commit_message>
Modified the notebook, presentation and the README.md
</commit_message>
<xml_diff>
--- a/SyriaTel Customer Churn Prediction Presentation.pptx
+++ b/SyriaTel Customer Churn Prediction Presentation.pptx
@@ -8,11 +8,12 @@
     <p:sldId id="256" r:id="rId2"/>
     <p:sldId id="257" r:id="rId3"/>
     <p:sldId id="258" r:id="rId4"/>
-    <p:sldId id="259" r:id="rId5"/>
-    <p:sldId id="260" r:id="rId6"/>
-    <p:sldId id="261" r:id="rId7"/>
-    <p:sldId id="262" r:id="rId8"/>
-    <p:sldId id="263" r:id="rId9"/>
+    <p:sldId id="264" r:id="rId5"/>
+    <p:sldId id="259" r:id="rId6"/>
+    <p:sldId id="260" r:id="rId7"/>
+    <p:sldId id="261" r:id="rId8"/>
+    <p:sldId id="262" r:id="rId9"/>
+    <p:sldId id="263" r:id="rId10"/>
   </p:sldIdLst>
   <p:sldSz cx="12192000" cy="6858000"/>
   <p:notesSz cx="6858000" cy="9144000"/>
@@ -111,6 +112,11 @@
       </a:defRPr>
     </a:lvl9pPr>
   </p:defaultTextStyle>
+  <p:extLst>
+    <p:ext uri="{EFAFB233-063F-42B5-8137-9DF3F51BA10A}">
+      <p15:sldGuideLst xmlns:p15="http://schemas.microsoft.com/office/powerpoint/2012/main"/>
+    </p:ext>
+  </p:extLst>
 </p:presentation>
 </file>
 
@@ -261,7 +267,7 @@
           <a:p>
             <a:fld id="{7F1FAD92-9E64-47FA-8B3D-4E7D2A292C74}" type="datetimeFigureOut">
               <a:rPr lang="en-US" smtClean="0"/>
-              <a:t>22-Feb-25</a:t>
+              <a:t>23-Feb-25</a:t>
             </a:fld>
             <a:endParaRPr lang="en-US" dirty="0"/>
           </a:p>
@@ -459,7 +465,7 @@
           <a:p>
             <a:fld id="{7F1FAD92-9E64-47FA-8B3D-4E7D2A292C74}" type="datetimeFigureOut">
               <a:rPr lang="en-US" smtClean="0"/>
-              <a:t>22-Feb-25</a:t>
+              <a:t>23-Feb-25</a:t>
             </a:fld>
             <a:endParaRPr lang="en-US" dirty="0"/>
           </a:p>
@@ -667,7 +673,7 @@
           <a:p>
             <a:fld id="{7F1FAD92-9E64-47FA-8B3D-4E7D2A292C74}" type="datetimeFigureOut">
               <a:rPr lang="en-US" smtClean="0"/>
-              <a:t>22-Feb-25</a:t>
+              <a:t>23-Feb-25</a:t>
             </a:fld>
             <a:endParaRPr lang="en-US" dirty="0"/>
           </a:p>
@@ -865,7 +871,7 @@
           <a:p>
             <a:fld id="{7F1FAD92-9E64-47FA-8B3D-4E7D2A292C74}" type="datetimeFigureOut">
               <a:rPr lang="en-US" smtClean="0"/>
-              <a:t>22-Feb-25</a:t>
+              <a:t>23-Feb-25</a:t>
             </a:fld>
             <a:endParaRPr lang="en-US" dirty="0"/>
           </a:p>
@@ -1140,7 +1146,7 @@
           <a:p>
             <a:fld id="{7F1FAD92-9E64-47FA-8B3D-4E7D2A292C74}" type="datetimeFigureOut">
               <a:rPr lang="en-US" smtClean="0"/>
-              <a:t>22-Feb-25</a:t>
+              <a:t>23-Feb-25</a:t>
             </a:fld>
             <a:endParaRPr lang="en-US" dirty="0"/>
           </a:p>
@@ -1405,7 +1411,7 @@
           <a:p>
             <a:fld id="{7F1FAD92-9E64-47FA-8B3D-4E7D2A292C74}" type="datetimeFigureOut">
               <a:rPr lang="en-US" smtClean="0"/>
-              <a:t>22-Feb-25</a:t>
+              <a:t>23-Feb-25</a:t>
             </a:fld>
             <a:endParaRPr lang="en-US" dirty="0"/>
           </a:p>
@@ -1817,7 +1823,7 @@
           <a:p>
             <a:fld id="{7F1FAD92-9E64-47FA-8B3D-4E7D2A292C74}" type="datetimeFigureOut">
               <a:rPr lang="en-US" smtClean="0"/>
-              <a:t>22-Feb-25</a:t>
+              <a:t>23-Feb-25</a:t>
             </a:fld>
             <a:endParaRPr lang="en-US" dirty="0"/>
           </a:p>
@@ -1958,7 +1964,7 @@
           <a:p>
             <a:fld id="{7F1FAD92-9E64-47FA-8B3D-4E7D2A292C74}" type="datetimeFigureOut">
               <a:rPr lang="en-US" smtClean="0"/>
-              <a:t>22-Feb-25</a:t>
+              <a:t>23-Feb-25</a:t>
             </a:fld>
             <a:endParaRPr lang="en-US" dirty="0"/>
           </a:p>
@@ -2071,7 +2077,7 @@
           <a:p>
             <a:fld id="{7F1FAD92-9E64-47FA-8B3D-4E7D2A292C74}" type="datetimeFigureOut">
               <a:rPr lang="en-US" smtClean="0"/>
-              <a:t>22-Feb-25</a:t>
+              <a:t>23-Feb-25</a:t>
             </a:fld>
             <a:endParaRPr lang="en-US" dirty="0"/>
           </a:p>
@@ -2382,7 +2388,7 @@
           <a:p>
             <a:fld id="{7F1FAD92-9E64-47FA-8B3D-4E7D2A292C74}" type="datetimeFigureOut">
               <a:rPr lang="en-US" smtClean="0"/>
-              <a:t>22-Feb-25</a:t>
+              <a:t>23-Feb-25</a:t>
             </a:fld>
             <a:endParaRPr lang="en-US" dirty="0"/>
           </a:p>
@@ -2670,7 +2676,7 @@
           <a:p>
             <a:fld id="{7F1FAD92-9E64-47FA-8B3D-4E7D2A292C74}" type="datetimeFigureOut">
               <a:rPr lang="en-US" smtClean="0"/>
-              <a:t>22-Feb-25</a:t>
+              <a:t>23-Feb-25</a:t>
             </a:fld>
             <a:endParaRPr lang="en-US" dirty="0"/>
           </a:p>
@@ -2921,7 +2927,7 @@
           <a:p>
             <a:fld id="{7F1FAD92-9E64-47FA-8B3D-4E7D2A292C74}" type="datetimeFigureOut">
               <a:rPr lang="en-US" smtClean="0"/>
-              <a:t>22-Feb-25</a:t>
+              <a:t>23-Feb-25</a:t>
             </a:fld>
             <a:endParaRPr lang="en-US" dirty="0"/>
           </a:p>
@@ -3615,8 +3621,8 @@
         </p:nvSpPr>
         <p:spPr>
           <a:xfrm>
-            <a:off x="500743" y="365125"/>
-            <a:ext cx="10853057" cy="752475"/>
+            <a:off x="500743" y="1"/>
+            <a:ext cx="10853057" cy="816428"/>
           </a:xfrm>
         </p:spPr>
         <p:txBody>
@@ -3654,13 +3660,13 @@
         </p:nvSpPr>
         <p:spPr>
           <a:xfrm>
-            <a:off x="838200" y="1248229"/>
-            <a:ext cx="10515600" cy="4928734"/>
+            <a:off x="762000" y="816429"/>
+            <a:ext cx="10853058" cy="6041571"/>
           </a:xfrm>
         </p:spPr>
         <p:txBody>
           <a:bodyPr>
-            <a:normAutofit/>
+            <a:normAutofit lnSpcReduction="10000"/>
           </a:bodyPr>
           <a:lstStyle/>
           <a:p>
@@ -3668,7 +3674,7 @@
               <a:buNone/>
             </a:pPr>
             <a:r>
-              <a:rPr lang="en-US" sz="2000" b="1" dirty="0">
+              <a:rPr lang="en-US" sz="2100" b="1" dirty="0">
                 <a:latin typeface="Times New Roman" panose="02020603050405020304" pitchFamily="18" charset="0"/>
                 <a:cs typeface="Times New Roman" panose="02020603050405020304" pitchFamily="18" charset="0"/>
               </a:rPr>
@@ -3691,65 +3697,15 @@
               </a:tabLst>
             </a:pPr>
             <a:r>
-              <a:rPr lang="en-US" sz="1800" kern="100" dirty="0">
+              <a:rPr lang="en-US" sz="1900" kern="100" dirty="0">
                 <a:effectLst/>
                 <a:latin typeface="Times New Roman" panose="02020603050405020304" pitchFamily="18" charset="0"/>
                 <a:ea typeface="Calibri" panose="020F0502020204030204" pitchFamily="34" charset="0"/>
                 <a:cs typeface="Times New Roman" panose="02020603050405020304" pitchFamily="18" charset="0"/>
               </a:rPr>
-              <a:t>SyriaTel faces high customer churn, leading to revenue loss and increased customer acquisition costs.</a:t>
-            </a:r>
-          </a:p>
-          <a:p>
-            <a:pPr marL="342900" marR="0" lvl="0" indent="-342900">
-              <a:lnSpc>
-                <a:spcPct val="107000"/>
-              </a:lnSpc>
-              <a:spcAft>
-                <a:spcPts val="800"/>
-              </a:spcAft>
-              <a:buSzPts val="1000"/>
-              <a:buFont typeface="Symbol" panose="05050102010706020507" pitchFamily="18" charset="2"/>
-              <a:buChar char=""/>
-              <a:tabLst>
-                <a:tab pos="457200" algn="l"/>
-              </a:tabLst>
-            </a:pPr>
-            <a:r>
-              <a:rPr lang="en-US" sz="1800" kern="100" dirty="0">
-                <a:effectLst/>
-                <a:latin typeface="Times New Roman" panose="02020603050405020304" pitchFamily="18" charset="0"/>
-                <a:ea typeface="Calibri" panose="020F0502020204030204" pitchFamily="34" charset="0"/>
-                <a:cs typeface="Times New Roman" panose="02020603050405020304" pitchFamily="18" charset="0"/>
-              </a:rPr>
-              <a:t>Without proactive measures, the company risks losing market share.</a:t>
-            </a:r>
-          </a:p>
-          <a:p>
-            <a:pPr marL="342900" marR="0" lvl="0" indent="-342900">
-              <a:lnSpc>
-                <a:spcPct val="107000"/>
-              </a:lnSpc>
-              <a:spcAft>
-                <a:spcPts val="800"/>
-              </a:spcAft>
-              <a:buSzPts val="1000"/>
-              <a:buFont typeface="Symbol" panose="05050102010706020507" pitchFamily="18" charset="2"/>
-              <a:buChar char=""/>
-              <a:tabLst>
-                <a:tab pos="457200" algn="l"/>
-              </a:tabLst>
-            </a:pPr>
-            <a:r>
-              <a:rPr lang="en-US" sz="1800" kern="100" dirty="0">
-                <a:effectLst/>
-                <a:latin typeface="Times New Roman" panose="02020603050405020304" pitchFamily="18" charset="0"/>
-                <a:ea typeface="Calibri" panose="020F0502020204030204" pitchFamily="34" charset="0"/>
-                <a:cs typeface="Times New Roman" panose="02020603050405020304" pitchFamily="18" charset="0"/>
-              </a:rPr>
-              <a:t>Predicting churn helps retain customers through targeted interventions.</a:t>
-            </a:r>
-            <a:endParaRPr lang="en-US" sz="1800" dirty="0">
+              <a:t>SyriaTel faces high customer churn, leading to revenue loss and increased customer acquisition costs. Without proactive measures, the company risks losing market share. Predicting churn helps retain customers through targeted interventions.</a:t>
+            </a:r>
+            <a:endParaRPr lang="en-US" sz="1900" dirty="0">
               <a:latin typeface="Times New Roman" panose="02020603050405020304" pitchFamily="18" charset="0"/>
               <a:cs typeface="Times New Roman" panose="02020603050405020304" pitchFamily="18" charset="0"/>
             </a:endParaRPr>
@@ -3758,8 +3714,17 @@
             <a:pPr marL="0" indent="0">
               <a:buNone/>
             </a:pPr>
-            <a:r>
-              <a:rPr lang="en-US" sz="2000" b="1" dirty="0">
+            <a:endParaRPr lang="en-US" sz="2100" b="1" dirty="0">
+              <a:latin typeface="Times New Roman" panose="02020603050405020304" pitchFamily="18" charset="0"/>
+              <a:cs typeface="Times New Roman" panose="02020603050405020304" pitchFamily="18" charset="0"/>
+            </a:endParaRPr>
+          </a:p>
+          <a:p>
+            <a:pPr marL="0" indent="0">
+              <a:buNone/>
+            </a:pPr>
+            <a:r>
+              <a:rPr lang="en-US" sz="2100" b="1" dirty="0">
                 <a:latin typeface="Times New Roman" panose="02020603050405020304" pitchFamily="18" charset="0"/>
                 <a:cs typeface="Times New Roman" panose="02020603050405020304" pitchFamily="18" charset="0"/>
               </a:rPr>
@@ -3768,7 +3733,7 @@
           </a:p>
           <a:p>
             <a:r>
-              <a:rPr lang="en-US" sz="1800" i="0" dirty="0">
+              <a:rPr lang="en-US" sz="1900" i="0" dirty="0">
                 <a:solidFill>
                   <a:srgbClr val="1F2328"/>
                 </a:solidFill>
@@ -3781,7 +3746,7 @@
           </a:p>
           <a:p>
             <a:r>
-              <a:rPr lang="en-US" sz="1800" i="0" dirty="0">
+              <a:rPr lang="en-US" sz="1900" i="0" dirty="0">
                 <a:solidFill>
                   <a:srgbClr val="1F2328"/>
                 </a:solidFill>
@@ -3794,7 +3759,7 @@
           </a:p>
           <a:p>
             <a:r>
-              <a:rPr lang="en-US" sz="1800" dirty="0">
+              <a:rPr lang="en-US" sz="1900" dirty="0">
                 <a:effectLst/>
                 <a:latin typeface="Times New Roman" panose="02020603050405020304" pitchFamily="18" charset="0"/>
                 <a:ea typeface="Calibri" panose="020F0502020204030204" pitchFamily="34" charset="0"/>
@@ -3802,10 +3767,54 @@
               </a:rPr>
               <a:t>Target variable: Churn (1 = customer left, 0 = customer stayed).</a:t>
             </a:r>
-            <a:endParaRPr lang="en-US" sz="1800" dirty="0">
-              <a:latin typeface="Times New Roman" panose="02020603050405020304" pitchFamily="18" charset="0"/>
-              <a:cs typeface="Times New Roman" panose="02020603050405020304" pitchFamily="18" charset="0"/>
-            </a:endParaRPr>
+          </a:p>
+          <a:p>
+            <a:r>
+              <a:rPr lang="en-US" sz="1900" dirty="0">
+                <a:latin typeface="Times New Roman" panose="02020603050405020304" pitchFamily="18" charset="0"/>
+                <a:cs typeface="Times New Roman" panose="02020603050405020304" pitchFamily="18" charset="0"/>
+              </a:rPr>
+              <a:t>Engineered three new features to enhance model performance:</a:t>
+            </a:r>
+          </a:p>
+          <a:p>
+            <a:pPr lvl="1"/>
+            <a:r>
+              <a:rPr lang="en-US" sz="1900" dirty="0">
+                <a:latin typeface="Times New Roman" panose="02020603050405020304" pitchFamily="18" charset="0"/>
+                <a:cs typeface="Times New Roman" panose="02020603050405020304" pitchFamily="18" charset="0"/>
+              </a:rPr>
+              <a:t>Total Minutes: Sum of day, evening, and night minutes</a:t>
+            </a:r>
+          </a:p>
+          <a:p>
+            <a:pPr lvl="1"/>
+            <a:r>
+              <a:rPr lang="en-US" sz="1900" dirty="0">
+                <a:latin typeface="Times New Roman" panose="02020603050405020304" pitchFamily="18" charset="0"/>
+                <a:cs typeface="Times New Roman" panose="02020603050405020304" pitchFamily="18" charset="0"/>
+              </a:rPr>
+              <a:t>Total Calls: Sum of day, evening, and night calls</a:t>
+            </a:r>
+          </a:p>
+          <a:p>
+            <a:pPr lvl="1"/>
+            <a:r>
+              <a:rPr lang="en-US" sz="1900" dirty="0">
+                <a:latin typeface="Times New Roman" panose="02020603050405020304" pitchFamily="18" charset="0"/>
+                <a:cs typeface="Times New Roman" panose="02020603050405020304" pitchFamily="18" charset="0"/>
+              </a:rPr>
+              <a:t>Total Charges: Sum of day, evening, and night charges</a:t>
+            </a:r>
+          </a:p>
+          <a:p>
+            <a:r>
+              <a:rPr lang="en-US" sz="1900" dirty="0">
+                <a:latin typeface="Times New Roman" panose="02020603050405020304" pitchFamily="18" charset="0"/>
+                <a:cs typeface="Times New Roman" panose="02020603050405020304" pitchFamily="18" charset="0"/>
+              </a:rPr>
+              <a:t>These features provide a more comprehensive view of customer usage patterns and their relationship with churn.</a:t>
+            </a:r>
           </a:p>
         </p:txBody>
       </p:sp>
@@ -3844,6 +3853,221 @@
           <p:cNvPr id="2" name="Title 1">
             <a:extLst>
               <a:ext uri="{FF2B5EF4-FFF2-40B4-BE49-F238E27FC236}">
+                <a16:creationId xmlns:a16="http://schemas.microsoft.com/office/drawing/2014/main" id="{ABFBFA47-0497-ED5C-488A-9D3FD146B52A}"/>
+              </a:ext>
+            </a:extLst>
+          </p:cNvPr>
+          <p:cNvSpPr>
+            <a:spLocks noGrp="1"/>
+          </p:cNvSpPr>
+          <p:nvPr>
+            <p:ph type="ctrTitle"/>
+          </p:nvPr>
+        </p:nvSpPr>
+        <p:spPr>
+          <a:xfrm>
+            <a:off x="1524000" y="173039"/>
+            <a:ext cx="9144000" cy="676047"/>
+          </a:xfrm>
+        </p:spPr>
+        <p:txBody>
+          <a:bodyPr>
+            <a:normAutofit/>
+          </a:bodyPr>
+          <a:lstStyle/>
+          <a:p>
+            <a:r>
+              <a:rPr lang="en-US" sz="3200" b="1" dirty="0">
+                <a:latin typeface="Times New Roman" panose="02020603050405020304" pitchFamily="18" charset="0"/>
+                <a:cs typeface="Times New Roman" panose="02020603050405020304" pitchFamily="18" charset="0"/>
+              </a:rPr>
+              <a:t>EXPLORATORY DATA ANALYSIS</a:t>
+            </a:r>
+          </a:p>
+        </p:txBody>
+      </p:sp>
+      <p:sp>
+        <p:nvSpPr>
+          <p:cNvPr id="3" name="Subtitle 2">
+            <a:extLst>
+              <a:ext uri="{FF2B5EF4-FFF2-40B4-BE49-F238E27FC236}">
+                <a16:creationId xmlns:a16="http://schemas.microsoft.com/office/drawing/2014/main" id="{858DC648-ECAD-79D2-C63A-FEF535F51290}"/>
+              </a:ext>
+            </a:extLst>
+          </p:cNvPr>
+          <p:cNvSpPr>
+            <a:spLocks noGrp="1"/>
+          </p:cNvSpPr>
+          <p:nvPr>
+            <p:ph type="subTitle" idx="1"/>
+          </p:nvPr>
+        </p:nvSpPr>
+        <p:spPr>
+          <a:xfrm>
+            <a:off x="892629" y="990600"/>
+            <a:ext cx="10319657" cy="5780314"/>
+          </a:xfrm>
+        </p:spPr>
+        <p:txBody>
+          <a:bodyPr/>
+          <a:lstStyle/>
+          <a:p>
+            <a:pPr marL="285750" indent="-285750" algn="l">
+              <a:buFont typeface="Times New Roman" panose="02020603050405020304" pitchFamily="18" charset="0"/>
+              <a:buChar char="―"/>
+            </a:pPr>
+            <a:r>
+              <a:rPr lang="en-US" sz="1800" dirty="0">
+                <a:latin typeface="Times New Roman" panose="02020603050405020304" pitchFamily="18" charset="0"/>
+                <a:cs typeface="Times New Roman" panose="02020603050405020304" pitchFamily="18" charset="0"/>
+              </a:rPr>
+              <a:t>Conducted exploratory data analysis (EDA) using:</a:t>
+            </a:r>
+          </a:p>
+          <a:p>
+            <a:pPr marL="285750" indent="-285750" algn="l">
+              <a:buFont typeface="Arial" panose="020B0604020202020204" pitchFamily="34" charset="0"/>
+              <a:buChar char="•"/>
+            </a:pPr>
+            <a:r>
+              <a:rPr lang="en-US" sz="1800" b="1" dirty="0">
+                <a:latin typeface="Times New Roman" panose="02020603050405020304" pitchFamily="18" charset="0"/>
+                <a:cs typeface="Times New Roman" panose="02020603050405020304" pitchFamily="18" charset="0"/>
+              </a:rPr>
+              <a:t>Correlation Heatmap: </a:t>
+            </a:r>
+            <a:r>
+              <a:rPr lang="en-US" sz="1800" dirty="0">
+                <a:latin typeface="Times New Roman" panose="02020603050405020304" pitchFamily="18" charset="0"/>
+                <a:cs typeface="Times New Roman" panose="02020603050405020304" pitchFamily="18" charset="0"/>
+              </a:rPr>
+              <a:t>Showed a strong correlation between total minutes and total charges, confirming their redundancy but importance.</a:t>
+            </a:r>
+          </a:p>
+          <a:p>
+            <a:pPr marL="285750" indent="-285750" algn="l">
+              <a:buFont typeface="Arial" panose="020B0604020202020204" pitchFamily="34" charset="0"/>
+              <a:buChar char="•"/>
+            </a:pPr>
+            <a:r>
+              <a:rPr lang="en-US" sz="1800" b="1" dirty="0" err="1">
+                <a:latin typeface="Times New Roman" panose="02020603050405020304" pitchFamily="18" charset="0"/>
+                <a:cs typeface="Times New Roman" panose="02020603050405020304" pitchFamily="18" charset="0"/>
+              </a:rPr>
+              <a:t>Pairplot</a:t>
+            </a:r>
+            <a:r>
+              <a:rPr lang="en-US" sz="1800" b="1" dirty="0">
+                <a:latin typeface="Times New Roman" panose="02020603050405020304" pitchFamily="18" charset="0"/>
+                <a:cs typeface="Times New Roman" panose="02020603050405020304" pitchFamily="18" charset="0"/>
+              </a:rPr>
+              <a:t>: </a:t>
+            </a:r>
+            <a:r>
+              <a:rPr lang="en-US" sz="1800" dirty="0">
+                <a:latin typeface="Times New Roman" panose="02020603050405020304" pitchFamily="18" charset="0"/>
+                <a:cs typeface="Times New Roman" panose="02020603050405020304" pitchFamily="18" charset="0"/>
+              </a:rPr>
+              <a:t>Highlighted differences in feature distributions between churned and non-churned customers.</a:t>
+            </a:r>
+          </a:p>
+          <a:p>
+            <a:pPr marL="285750" indent="-285750" algn="l">
+              <a:buFont typeface="Arial" panose="020B0604020202020204" pitchFamily="34" charset="0"/>
+              <a:buChar char="•"/>
+            </a:pPr>
+            <a:r>
+              <a:rPr lang="en-US" sz="1800" b="1" dirty="0">
+                <a:latin typeface="Times New Roman" panose="02020603050405020304" pitchFamily="18" charset="0"/>
+                <a:cs typeface="Times New Roman" panose="02020603050405020304" pitchFamily="18" charset="0"/>
+              </a:rPr>
+              <a:t>3D Scatter Plot: </a:t>
+            </a:r>
+            <a:r>
+              <a:rPr lang="en-US" sz="1800" dirty="0">
+                <a:latin typeface="Times New Roman" panose="02020603050405020304" pitchFamily="18" charset="0"/>
+                <a:cs typeface="Times New Roman" panose="02020603050405020304" pitchFamily="18" charset="0"/>
+              </a:rPr>
+              <a:t>Visualized the separation of churned vs. non-churned customers across the new features."</a:t>
+            </a:r>
+          </a:p>
+          <a:p>
+            <a:pPr algn="l"/>
+            <a:endParaRPr lang="en-US" dirty="0"/>
+          </a:p>
+        </p:txBody>
+      </p:sp>
+      <p:pic>
+        <p:nvPicPr>
+          <p:cNvPr id="5" name="Picture 4">
+            <a:extLst>
+              <a:ext uri="{FF2B5EF4-FFF2-40B4-BE49-F238E27FC236}">
+                <a16:creationId xmlns:a16="http://schemas.microsoft.com/office/drawing/2014/main" id="{3000F073-B7FD-1D04-3FCF-772C9A59D035}"/>
+              </a:ext>
+            </a:extLst>
+          </p:cNvPr>
+          <p:cNvPicPr>
+            <a:picLocks noChangeAspect="1"/>
+          </p:cNvPicPr>
+          <p:nvPr/>
+        </p:nvPicPr>
+        <p:blipFill>
+          <a:blip r:embed="rId2">
+            <a:extLst>
+              <a:ext uri="{28A0092B-C50C-407E-A947-70E740481C1C}">
+                <a14:useLocalDpi xmlns:a14="http://schemas.microsoft.com/office/drawing/2010/main" val="0"/>
+              </a:ext>
+            </a:extLst>
+          </a:blip>
+          <a:stretch>
+            <a:fillRect/>
+          </a:stretch>
+        </p:blipFill>
+        <p:spPr>
+          <a:xfrm>
+            <a:off x="979714" y="2827468"/>
+            <a:ext cx="4616687" cy="3772094"/>
+          </a:xfrm>
+          <a:prstGeom prst="rect">
+            <a:avLst/>
+          </a:prstGeom>
+        </p:spPr>
+      </p:pic>
+    </p:spTree>
+    <p:extLst>
+      <p:ext uri="{BB962C8B-B14F-4D97-AF65-F5344CB8AC3E}">
+        <p14:creationId xmlns:p14="http://schemas.microsoft.com/office/powerpoint/2010/main" val="268305358"/>
+      </p:ext>
+    </p:extLst>
+  </p:cSld>
+  <p:clrMapOvr>
+    <a:masterClrMapping/>
+  </p:clrMapOvr>
+</p:sld>
+</file>
+
+<file path=ppt/slides/slide5.xml><?xml version="1.0" encoding="utf-8"?>
+<p:sld xmlns:a="http://schemas.openxmlformats.org/drawingml/2006/main" xmlns:r="http://schemas.openxmlformats.org/officeDocument/2006/relationships" xmlns:p="http://schemas.openxmlformats.org/presentationml/2006/main">
+  <p:cSld>
+    <p:spTree>
+      <p:nvGrpSpPr>
+        <p:cNvPr id="1" name=""/>
+        <p:cNvGrpSpPr/>
+        <p:nvPr/>
+      </p:nvGrpSpPr>
+      <p:grpSpPr>
+        <a:xfrm>
+          <a:off x="0" y="0"/>
+          <a:ext cx="0" cy="0"/>
+          <a:chOff x="0" y="0"/>
+          <a:chExt cx="0" cy="0"/>
+        </a:xfrm>
+      </p:grpSpPr>
+      <p:sp>
+        <p:nvSpPr>
+          <p:cNvPr id="2" name="Title 1">
+            <a:extLst>
+              <a:ext uri="{FF2B5EF4-FFF2-40B4-BE49-F238E27FC236}">
                 <a16:creationId xmlns:a16="http://schemas.microsoft.com/office/drawing/2014/main" id="{328713CA-F605-7D39-5566-3ADBDE848962}"/>
               </a:ext>
             </a:extLst>
@@ -4109,7 +4333,7 @@
 </p:sld>
 </file>
 
-<file path=ppt/slides/slide5.xml><?xml version="1.0" encoding="utf-8"?>
+<file path=ppt/slides/slide6.xml><?xml version="1.0" encoding="utf-8"?>
 <p:sld xmlns:a="http://schemas.openxmlformats.org/drawingml/2006/main" xmlns:r="http://schemas.openxmlformats.org/officeDocument/2006/relationships" xmlns:p="http://schemas.openxmlformats.org/presentationml/2006/main">
   <p:cSld>
     <p:spTree>
@@ -4965,230 +5189,6 @@
 </p:sld>
 </file>
 
-<file path=ppt/slides/slide6.xml><?xml version="1.0" encoding="utf-8"?>
-<p:sld xmlns:a="http://schemas.openxmlformats.org/drawingml/2006/main" xmlns:r="http://schemas.openxmlformats.org/officeDocument/2006/relationships" xmlns:p="http://schemas.openxmlformats.org/presentationml/2006/main">
-  <p:cSld>
-    <p:spTree>
-      <p:nvGrpSpPr>
-        <p:cNvPr id="1" name=""/>
-        <p:cNvGrpSpPr/>
-        <p:nvPr/>
-      </p:nvGrpSpPr>
-      <p:grpSpPr>
-        <a:xfrm>
-          <a:off x="0" y="0"/>
-          <a:ext cx="0" cy="0"/>
-          <a:chOff x="0" y="0"/>
-          <a:chExt cx="0" cy="0"/>
-        </a:xfrm>
-      </p:grpSpPr>
-      <p:sp>
-        <p:nvSpPr>
-          <p:cNvPr id="2" name="Title 1">
-            <a:extLst>
-              <a:ext uri="{FF2B5EF4-FFF2-40B4-BE49-F238E27FC236}">
-                <a16:creationId xmlns:a16="http://schemas.microsoft.com/office/drawing/2014/main" id="{4F877E93-72E0-F823-257A-7BDB0C94A6C3}"/>
-              </a:ext>
-            </a:extLst>
-          </p:cNvPr>
-          <p:cNvSpPr>
-            <a:spLocks noGrp="1"/>
-          </p:cNvSpPr>
-          <p:nvPr>
-            <p:ph type="title"/>
-          </p:nvPr>
-        </p:nvSpPr>
-        <p:spPr>
-          <a:xfrm>
-            <a:off x="838200" y="365125"/>
-            <a:ext cx="10236200" cy="721995"/>
-          </a:xfrm>
-        </p:spPr>
-        <p:txBody>
-          <a:bodyPr>
-            <a:normAutofit/>
-          </a:bodyPr>
-          <a:lstStyle/>
-          <a:p>
-            <a:pPr algn="ctr"/>
-            <a:r>
-              <a:rPr lang="en-US" sz="3200" b="1" dirty="0">
-                <a:latin typeface="Times New Roman" panose="02020603050405020304" pitchFamily="18" charset="0"/>
-                <a:cs typeface="Times New Roman" panose="02020603050405020304" pitchFamily="18" charset="0"/>
-              </a:rPr>
-              <a:t>RECOMMENDATIONS</a:t>
-            </a:r>
-          </a:p>
-        </p:txBody>
-      </p:sp>
-      <p:sp>
-        <p:nvSpPr>
-          <p:cNvPr id="3" name="Content Placeholder 2">
-            <a:extLst>
-              <a:ext uri="{FF2B5EF4-FFF2-40B4-BE49-F238E27FC236}">
-                <a16:creationId xmlns:a16="http://schemas.microsoft.com/office/drawing/2014/main" id="{579B91CE-F144-5FBF-3E32-AC42633A9FDF}"/>
-              </a:ext>
-            </a:extLst>
-          </p:cNvPr>
-          <p:cNvSpPr>
-            <a:spLocks noGrp="1"/>
-          </p:cNvSpPr>
-          <p:nvPr>
-            <p:ph idx="1"/>
-          </p:nvPr>
-        </p:nvSpPr>
-        <p:spPr>
-          <a:xfrm>
-            <a:off x="838200" y="1825625"/>
-            <a:ext cx="10515600" cy="2929255"/>
-          </a:xfrm>
-        </p:spPr>
-        <p:txBody>
-          <a:bodyPr/>
-          <a:lstStyle/>
-          <a:p>
-            <a:pPr marL="342900" marR="0" lvl="0" indent="-342900">
-              <a:lnSpc>
-                <a:spcPct val="100000"/>
-              </a:lnSpc>
-              <a:spcAft>
-                <a:spcPts val="800"/>
-              </a:spcAft>
-              <a:buSzPts val="1000"/>
-              <a:buFont typeface="Symbol" panose="05050102010706020507" pitchFamily="18" charset="2"/>
-              <a:buChar char=""/>
-              <a:tabLst>
-                <a:tab pos="457200" algn="l"/>
-              </a:tabLst>
-            </a:pPr>
-            <a:r>
-              <a:rPr lang="en-US" sz="1800" kern="100" dirty="0">
-                <a:effectLst/>
-                <a:latin typeface="Times New Roman" panose="02020603050405020304" pitchFamily="18" charset="0"/>
-                <a:ea typeface="Calibri" panose="020F0502020204030204" pitchFamily="34" charset="0"/>
-                <a:cs typeface="Times New Roman" panose="02020603050405020304" pitchFamily="18" charset="0"/>
-              </a:rPr>
-              <a:t>Target high-risk customers with personalized retention offers.</a:t>
-            </a:r>
-          </a:p>
-          <a:p>
-            <a:pPr marL="342900" marR="0" lvl="0" indent="-342900">
-              <a:lnSpc>
-                <a:spcPct val="100000"/>
-              </a:lnSpc>
-              <a:spcAft>
-                <a:spcPts val="800"/>
-              </a:spcAft>
-              <a:buSzPts val="1000"/>
-              <a:buFont typeface="Symbol" panose="05050102010706020507" pitchFamily="18" charset="2"/>
-              <a:buChar char=""/>
-              <a:tabLst>
-                <a:tab pos="457200" algn="l"/>
-              </a:tabLst>
-            </a:pPr>
-            <a:r>
-              <a:rPr lang="en-US" sz="1800" kern="100" dirty="0">
-                <a:effectLst/>
-                <a:latin typeface="Times New Roman" panose="02020603050405020304" pitchFamily="18" charset="0"/>
-                <a:ea typeface="Calibri" panose="020F0502020204030204" pitchFamily="34" charset="0"/>
-                <a:cs typeface="Times New Roman" panose="02020603050405020304" pitchFamily="18" charset="0"/>
-              </a:rPr>
-              <a:t>Enhance customer support by improving service training and reducing wait times.</a:t>
-            </a:r>
-          </a:p>
-          <a:p>
-            <a:pPr marL="342900" marR="0" lvl="0" indent="-342900">
-              <a:lnSpc>
-                <a:spcPct val="100000"/>
-              </a:lnSpc>
-              <a:spcAft>
-                <a:spcPts val="800"/>
-              </a:spcAft>
-              <a:buSzPts val="1000"/>
-              <a:buFont typeface="Symbol" panose="05050102010706020507" pitchFamily="18" charset="2"/>
-              <a:buChar char=""/>
-              <a:tabLst>
-                <a:tab pos="457200" algn="l"/>
-              </a:tabLst>
-            </a:pPr>
-            <a:r>
-              <a:rPr lang="en-US" sz="1800" kern="100" dirty="0">
-                <a:effectLst/>
-                <a:latin typeface="Times New Roman" panose="02020603050405020304" pitchFamily="18" charset="0"/>
-                <a:ea typeface="Calibri" panose="020F0502020204030204" pitchFamily="34" charset="0"/>
-                <a:cs typeface="Times New Roman" panose="02020603050405020304" pitchFamily="18" charset="0"/>
-              </a:rPr>
-              <a:t>Introduce flexible pricing plans and contract incentives to increase loyalty.</a:t>
-            </a:r>
-          </a:p>
-          <a:p>
-            <a:pPr marL="342900" marR="0" lvl="0" indent="-342900">
-              <a:lnSpc>
-                <a:spcPct val="100000"/>
-              </a:lnSpc>
-              <a:spcAft>
-                <a:spcPts val="800"/>
-              </a:spcAft>
-              <a:buSzPts val="1000"/>
-              <a:buFont typeface="Symbol" panose="05050102010706020507" pitchFamily="18" charset="2"/>
-              <a:buChar char=""/>
-              <a:tabLst>
-                <a:tab pos="457200" algn="l"/>
-              </a:tabLst>
-            </a:pPr>
-            <a:r>
-              <a:rPr lang="en-US" sz="1800" kern="100" dirty="0">
-                <a:effectLst/>
-                <a:latin typeface="Times New Roman" panose="02020603050405020304" pitchFamily="18" charset="0"/>
-                <a:ea typeface="Calibri" panose="020F0502020204030204" pitchFamily="34" charset="0"/>
-                <a:cs typeface="Times New Roman" panose="02020603050405020304" pitchFamily="18" charset="0"/>
-              </a:rPr>
-              <a:t>Monitor customer usage patterns to provide proactive engagement strategies.</a:t>
-            </a:r>
-          </a:p>
-          <a:p>
-            <a:pPr marL="342900" marR="0" lvl="0" indent="-342900">
-              <a:lnSpc>
-                <a:spcPct val="100000"/>
-              </a:lnSpc>
-              <a:spcAft>
-                <a:spcPts val="800"/>
-              </a:spcAft>
-              <a:buSzPts val="1000"/>
-              <a:buFont typeface="Symbol" panose="05050102010706020507" pitchFamily="18" charset="2"/>
-              <a:buChar char=""/>
-              <a:tabLst>
-                <a:tab pos="457200" algn="l"/>
-              </a:tabLst>
-            </a:pPr>
-            <a:r>
-              <a:rPr lang="en-US" sz="1800" kern="100" dirty="0">
-                <a:effectLst/>
-                <a:latin typeface="Times New Roman" panose="02020603050405020304" pitchFamily="18" charset="0"/>
-                <a:ea typeface="Calibri" panose="020F0502020204030204" pitchFamily="34" charset="0"/>
-                <a:cs typeface="Times New Roman" panose="02020603050405020304" pitchFamily="18" charset="0"/>
-              </a:rPr>
-              <a:t>Implement a real-time churn monitoring system for quicker intervention.</a:t>
-            </a:r>
-          </a:p>
-          <a:p>
-            <a:endParaRPr lang="en-US" dirty="0"/>
-          </a:p>
-        </p:txBody>
-      </p:sp>
-    </p:spTree>
-    <p:extLst>
-      <p:ext uri="{BB962C8B-B14F-4D97-AF65-F5344CB8AC3E}">
-        <p14:creationId xmlns:p14="http://schemas.microsoft.com/office/powerpoint/2010/main" val="2530147958"/>
-      </p:ext>
-    </p:extLst>
-  </p:cSld>
-  <p:clrMapOvr>
-    <a:masterClrMapping/>
-  </p:clrMapOvr>
-</p:sld>
-</file>
-
 <file path=ppt/slides/slide7.xml><?xml version="1.0" encoding="utf-8"?>
 <p:sld xmlns:a="http://schemas.openxmlformats.org/drawingml/2006/main" xmlns:r="http://schemas.openxmlformats.org/officeDocument/2006/relationships" xmlns:p="http://schemas.openxmlformats.org/presentationml/2006/main">
   <p:cSld>
@@ -5211,7 +5211,7 @@
           <p:cNvPr id="2" name="Title 1">
             <a:extLst>
               <a:ext uri="{FF2B5EF4-FFF2-40B4-BE49-F238E27FC236}">
-                <a16:creationId xmlns:a16="http://schemas.microsoft.com/office/drawing/2014/main" id="{8C0DE297-A83C-4739-6A9C-069A37F52F6D}"/>
+                <a16:creationId xmlns:a16="http://schemas.microsoft.com/office/drawing/2014/main" id="{4F877E93-72E0-F823-257A-7BDB0C94A6C3}"/>
               </a:ext>
             </a:extLst>
           </p:cNvPr>
@@ -5225,7 +5225,7 @@
         <p:spPr>
           <a:xfrm>
             <a:off x="838200" y="365125"/>
-            <a:ext cx="10515600" cy="925195"/>
+            <a:ext cx="10236200" cy="721995"/>
           </a:xfrm>
         </p:spPr>
         <p:txBody>
@@ -5240,7 +5240,7 @@
                 <a:latin typeface="Times New Roman" panose="02020603050405020304" pitchFamily="18" charset="0"/>
                 <a:cs typeface="Times New Roman" panose="02020603050405020304" pitchFamily="18" charset="0"/>
               </a:rPr>
-              <a:t>NEXT STEPS</a:t>
+              <a:t>RECOMMENDATIONS</a:t>
             </a:r>
           </a:p>
         </p:txBody>
@@ -5250,7 +5250,7 @@
           <p:cNvPr id="3" name="Content Placeholder 2">
             <a:extLst>
               <a:ext uri="{FF2B5EF4-FFF2-40B4-BE49-F238E27FC236}">
-                <a16:creationId xmlns:a16="http://schemas.microsoft.com/office/drawing/2014/main" id="{A1A34923-BF5B-0CB2-51F9-DA4C48D0DF38}"/>
+                <a16:creationId xmlns:a16="http://schemas.microsoft.com/office/drawing/2014/main" id="{579B91CE-F144-5FBF-3E32-AC42633A9FDF}"/>
               </a:ext>
             </a:extLst>
           </p:cNvPr>
@@ -5263,8 +5263,8 @@
         </p:nvSpPr>
         <p:spPr>
           <a:xfrm>
-            <a:off x="838200" y="1757681"/>
-            <a:ext cx="10515600" cy="3271519"/>
+            <a:off x="838200" y="1825625"/>
+            <a:ext cx="10515600" cy="2929255"/>
           </a:xfrm>
         </p:spPr>
         <p:txBody>
@@ -5292,7 +5292,7 @@
                 <a:ea typeface="Calibri" panose="020F0502020204030204" pitchFamily="34" charset="0"/>
                 <a:cs typeface="Times New Roman" panose="02020603050405020304" pitchFamily="18" charset="0"/>
               </a:rPr>
-              <a:t>Deploy the model for real-time churn prediction.</a:t>
+              <a:t>Target high-risk customers with personalized retention offers.</a:t>
             </a:r>
           </a:p>
           <a:p>
@@ -5317,7 +5317,7 @@
                 <a:ea typeface="Calibri" panose="020F0502020204030204" pitchFamily="34" charset="0"/>
                 <a:cs typeface="Times New Roman" panose="02020603050405020304" pitchFamily="18" charset="0"/>
               </a:rPr>
-              <a:t>Continuously update and retrain the model with new customer data.</a:t>
+              <a:t>Enhance customer support by improving service training and reducing wait times.</a:t>
             </a:r>
           </a:p>
           <a:p>
@@ -5342,6 +5342,230 @@
                 <a:ea typeface="Calibri" panose="020F0502020204030204" pitchFamily="34" charset="0"/>
                 <a:cs typeface="Times New Roman" panose="02020603050405020304" pitchFamily="18" charset="0"/>
               </a:rPr>
+              <a:t>Introduce flexible pricing plans and contract incentives to increase loyalty.</a:t>
+            </a:r>
+          </a:p>
+          <a:p>
+            <a:pPr marL="342900" marR="0" lvl="0" indent="-342900">
+              <a:lnSpc>
+                <a:spcPct val="100000"/>
+              </a:lnSpc>
+              <a:spcAft>
+                <a:spcPts val="800"/>
+              </a:spcAft>
+              <a:buSzPts val="1000"/>
+              <a:buFont typeface="Symbol" panose="05050102010706020507" pitchFamily="18" charset="2"/>
+              <a:buChar char=""/>
+              <a:tabLst>
+                <a:tab pos="457200" algn="l"/>
+              </a:tabLst>
+            </a:pPr>
+            <a:r>
+              <a:rPr lang="en-US" sz="1800" kern="100" dirty="0">
+                <a:effectLst/>
+                <a:latin typeface="Times New Roman" panose="02020603050405020304" pitchFamily="18" charset="0"/>
+                <a:ea typeface="Calibri" panose="020F0502020204030204" pitchFamily="34" charset="0"/>
+                <a:cs typeface="Times New Roman" panose="02020603050405020304" pitchFamily="18" charset="0"/>
+              </a:rPr>
+              <a:t>Monitor customer usage patterns to provide proactive engagement strategies.</a:t>
+            </a:r>
+          </a:p>
+          <a:p>
+            <a:pPr marL="342900" marR="0" lvl="0" indent="-342900">
+              <a:lnSpc>
+                <a:spcPct val="100000"/>
+              </a:lnSpc>
+              <a:spcAft>
+                <a:spcPts val="800"/>
+              </a:spcAft>
+              <a:buSzPts val="1000"/>
+              <a:buFont typeface="Symbol" panose="05050102010706020507" pitchFamily="18" charset="2"/>
+              <a:buChar char=""/>
+              <a:tabLst>
+                <a:tab pos="457200" algn="l"/>
+              </a:tabLst>
+            </a:pPr>
+            <a:r>
+              <a:rPr lang="en-US" sz="1800" kern="100" dirty="0">
+                <a:effectLst/>
+                <a:latin typeface="Times New Roman" panose="02020603050405020304" pitchFamily="18" charset="0"/>
+                <a:ea typeface="Calibri" panose="020F0502020204030204" pitchFamily="34" charset="0"/>
+                <a:cs typeface="Times New Roman" panose="02020603050405020304" pitchFamily="18" charset="0"/>
+              </a:rPr>
+              <a:t>Implement a real-time churn monitoring system for quicker intervention.</a:t>
+            </a:r>
+          </a:p>
+          <a:p>
+            <a:endParaRPr lang="en-US" dirty="0"/>
+          </a:p>
+        </p:txBody>
+      </p:sp>
+    </p:spTree>
+    <p:extLst>
+      <p:ext uri="{BB962C8B-B14F-4D97-AF65-F5344CB8AC3E}">
+        <p14:creationId xmlns:p14="http://schemas.microsoft.com/office/powerpoint/2010/main" val="2530147958"/>
+      </p:ext>
+    </p:extLst>
+  </p:cSld>
+  <p:clrMapOvr>
+    <a:masterClrMapping/>
+  </p:clrMapOvr>
+</p:sld>
+</file>
+
+<file path=ppt/slides/slide8.xml><?xml version="1.0" encoding="utf-8"?>
+<p:sld xmlns:a="http://schemas.openxmlformats.org/drawingml/2006/main" xmlns:r="http://schemas.openxmlformats.org/officeDocument/2006/relationships" xmlns:p="http://schemas.openxmlformats.org/presentationml/2006/main">
+  <p:cSld>
+    <p:spTree>
+      <p:nvGrpSpPr>
+        <p:cNvPr id="1" name=""/>
+        <p:cNvGrpSpPr/>
+        <p:nvPr/>
+      </p:nvGrpSpPr>
+      <p:grpSpPr>
+        <a:xfrm>
+          <a:off x="0" y="0"/>
+          <a:ext cx="0" cy="0"/>
+          <a:chOff x="0" y="0"/>
+          <a:chExt cx="0" cy="0"/>
+        </a:xfrm>
+      </p:grpSpPr>
+      <p:sp>
+        <p:nvSpPr>
+          <p:cNvPr id="2" name="Title 1">
+            <a:extLst>
+              <a:ext uri="{FF2B5EF4-FFF2-40B4-BE49-F238E27FC236}">
+                <a16:creationId xmlns:a16="http://schemas.microsoft.com/office/drawing/2014/main" id="{8C0DE297-A83C-4739-6A9C-069A37F52F6D}"/>
+              </a:ext>
+            </a:extLst>
+          </p:cNvPr>
+          <p:cNvSpPr>
+            <a:spLocks noGrp="1"/>
+          </p:cNvSpPr>
+          <p:nvPr>
+            <p:ph type="title"/>
+          </p:nvPr>
+        </p:nvSpPr>
+        <p:spPr>
+          <a:xfrm>
+            <a:off x="838200" y="365125"/>
+            <a:ext cx="10515600" cy="925195"/>
+          </a:xfrm>
+        </p:spPr>
+        <p:txBody>
+          <a:bodyPr>
+            <a:normAutofit/>
+          </a:bodyPr>
+          <a:lstStyle/>
+          <a:p>
+            <a:pPr algn="ctr"/>
+            <a:r>
+              <a:rPr lang="en-US" sz="3200" b="1" dirty="0">
+                <a:latin typeface="Times New Roman" panose="02020603050405020304" pitchFamily="18" charset="0"/>
+                <a:cs typeface="Times New Roman" panose="02020603050405020304" pitchFamily="18" charset="0"/>
+              </a:rPr>
+              <a:t>NEXT STEPS</a:t>
+            </a:r>
+          </a:p>
+        </p:txBody>
+      </p:sp>
+      <p:sp>
+        <p:nvSpPr>
+          <p:cNvPr id="3" name="Content Placeholder 2">
+            <a:extLst>
+              <a:ext uri="{FF2B5EF4-FFF2-40B4-BE49-F238E27FC236}">
+                <a16:creationId xmlns:a16="http://schemas.microsoft.com/office/drawing/2014/main" id="{A1A34923-BF5B-0CB2-51F9-DA4C48D0DF38}"/>
+              </a:ext>
+            </a:extLst>
+          </p:cNvPr>
+          <p:cNvSpPr>
+            <a:spLocks noGrp="1"/>
+          </p:cNvSpPr>
+          <p:nvPr>
+            <p:ph idx="1"/>
+          </p:nvPr>
+        </p:nvSpPr>
+        <p:spPr>
+          <a:xfrm>
+            <a:off x="838200" y="1757681"/>
+            <a:ext cx="10515600" cy="3271519"/>
+          </a:xfrm>
+        </p:spPr>
+        <p:txBody>
+          <a:bodyPr/>
+          <a:lstStyle/>
+          <a:p>
+            <a:pPr marL="342900" marR="0" lvl="0" indent="-342900">
+              <a:lnSpc>
+                <a:spcPct val="100000"/>
+              </a:lnSpc>
+              <a:spcAft>
+                <a:spcPts val="800"/>
+              </a:spcAft>
+              <a:buSzPts val="1000"/>
+              <a:buFont typeface="Symbol" panose="05050102010706020507" pitchFamily="18" charset="2"/>
+              <a:buChar char=""/>
+              <a:tabLst>
+                <a:tab pos="457200" algn="l"/>
+              </a:tabLst>
+            </a:pPr>
+            <a:r>
+              <a:rPr lang="en-US" sz="1800" kern="100" dirty="0">
+                <a:effectLst/>
+                <a:latin typeface="Times New Roman" panose="02020603050405020304" pitchFamily="18" charset="0"/>
+                <a:ea typeface="Calibri" panose="020F0502020204030204" pitchFamily="34" charset="0"/>
+                <a:cs typeface="Times New Roman" panose="02020603050405020304" pitchFamily="18" charset="0"/>
+              </a:rPr>
+              <a:t>Deploy the model for real-time churn prediction.</a:t>
+            </a:r>
+          </a:p>
+          <a:p>
+            <a:pPr marL="342900" marR="0" lvl="0" indent="-342900">
+              <a:lnSpc>
+                <a:spcPct val="100000"/>
+              </a:lnSpc>
+              <a:spcAft>
+                <a:spcPts val="800"/>
+              </a:spcAft>
+              <a:buSzPts val="1000"/>
+              <a:buFont typeface="Symbol" panose="05050102010706020507" pitchFamily="18" charset="2"/>
+              <a:buChar char=""/>
+              <a:tabLst>
+                <a:tab pos="457200" algn="l"/>
+              </a:tabLst>
+            </a:pPr>
+            <a:r>
+              <a:rPr lang="en-US" sz="1800" kern="100" dirty="0">
+                <a:effectLst/>
+                <a:latin typeface="Times New Roman" panose="02020603050405020304" pitchFamily="18" charset="0"/>
+                <a:ea typeface="Calibri" panose="020F0502020204030204" pitchFamily="34" charset="0"/>
+                <a:cs typeface="Times New Roman" panose="02020603050405020304" pitchFamily="18" charset="0"/>
+              </a:rPr>
+              <a:t>Continuously update and retrain the model with new customer data.</a:t>
+            </a:r>
+          </a:p>
+          <a:p>
+            <a:pPr marL="342900" marR="0" lvl="0" indent="-342900">
+              <a:lnSpc>
+                <a:spcPct val="100000"/>
+              </a:lnSpc>
+              <a:spcAft>
+                <a:spcPts val="800"/>
+              </a:spcAft>
+              <a:buSzPts val="1000"/>
+              <a:buFont typeface="Symbol" panose="05050102010706020507" pitchFamily="18" charset="2"/>
+              <a:buChar char=""/>
+              <a:tabLst>
+                <a:tab pos="457200" algn="l"/>
+              </a:tabLst>
+            </a:pPr>
+            <a:r>
+              <a:rPr lang="en-US" sz="1800" kern="100" dirty="0">
+                <a:effectLst/>
+                <a:latin typeface="Times New Roman" panose="02020603050405020304" pitchFamily="18" charset="0"/>
+                <a:ea typeface="Calibri" panose="020F0502020204030204" pitchFamily="34" charset="0"/>
+                <a:cs typeface="Times New Roman" panose="02020603050405020304" pitchFamily="18" charset="0"/>
+              </a:rPr>
               <a:t>Integrate model insights into SyriaTel’s CRM system for targeted retention strategies.</a:t>
             </a:r>
           </a:p>
@@ -5363,7 +5587,7 @@
 </p:sld>
 </file>
 
-<file path=ppt/slides/slide8.xml><?xml version="1.0" encoding="utf-8"?>
+<file path=ppt/slides/slide9.xml><?xml version="1.0" encoding="utf-8"?>
 <p:sld xmlns:a="http://schemas.openxmlformats.org/drawingml/2006/main" xmlns:r="http://schemas.openxmlformats.org/officeDocument/2006/relationships" xmlns:p="http://schemas.openxmlformats.org/presentationml/2006/main">
   <p:cSld>
     <p:spTree>

</xml_diff>